<commit_message>
Started multi-line graphs in data-viz-03
</commit_message>
<xml_diff>
--- a/data-viz-03/component/change-defaults.pptx
+++ b/data-viz-03/component/change-defaults.pptx
@@ -803,6 +803,768 @@
             <a:fld id="{18BDFEC3-8487-43E8-A154-7C12CBC1FFF2}" type="slidenum">
               <a:rPr lang="en-US"/>
               <a:t>2</a:t>
+            </a:fld>
+            <a:endParaRPr lang="en-US"/>
+          </a:p>
+        </p:txBody>
+      </p:sp>
+    </p:spTree>
+  </p:cSld>
+</p:notes>
+</file>
+
+<file path=ppt/notesSlides/notesSlide2.xml><?xml version="1.0" encoding="utf-8"?>
+<p:notes xmlns:a="http://schemas.openxmlformats.org/drawingml/2006/main" xmlns:r="http://schemas.openxmlformats.org/officeDocument/2006/relationships" xmlns:p="http://schemas.openxmlformats.org/presentationml/2006/main">
+  <p:cSld>
+    <p:spTree>
+      <p:nvGrpSpPr>
+        <p:cNvPr id="1" name=""/>
+        <p:cNvGrpSpPr/>
+        <p:nvPr/>
+      </p:nvGrpSpPr>
+      <p:grpSpPr>
+        <a:xfrm>
+          <a:off x="0" y="0"/>
+          <a:ext cx="0" cy="0"/>
+          <a:chOff x="0" y="0"/>
+          <a:chExt cx="0" cy="0"/>
+        </a:xfrm>
+      </p:grpSpPr>
+      <p:sp>
+        <p:nvSpPr>
+          <p:cNvPr id="2" name="Slide Image Placeholder 1"/>
+          <p:cNvSpPr>
+            <a:spLocks noGrp="1" noRot="1" noChangeAspect="1"/>
+          </p:cNvSpPr>
+          <p:nvPr>
+            <p:ph type="sldImg"/>
+          </p:nvPr>
+        </p:nvSpPr>
+        <p:spPr/>
+      </p:sp>
+      <p:sp>
+        <p:nvSpPr>
+          <p:cNvPr id="3" name="Notes Placeholder 2"/>
+          <p:cNvSpPr>
+            <a:spLocks noGrp="1"/>
+          </p:cNvSpPr>
+          <p:nvPr>
+            <p:ph type="body" idx="1"/>
+          </p:nvPr>
+        </p:nvSpPr>
+        <p:spPr/>
+        <p:txBody>
+          <a:bodyPr/>
+          <a:lstStyle/>
+          <a:p>
+            <a:pPr lvl="0" marL="0" indent="0">
+              <a:buNone/>
+            </a:pPr>
+            <a:r>
+              <a:rPr/>
+              <a:t>HEre</a:t>
+            </a:r>
+            <a:r>
+              <a:rPr/>
+              <a:t> </a:t>
+            </a:r>
+            <a:r>
+              <a:rPr/>
+              <a:t>is</a:t>
+            </a:r>
+            <a:r>
+              <a:rPr/>
+              <a:t> </a:t>
+            </a:r>
+            <a:r>
+              <a:rPr/>
+              <a:t>the</a:t>
+            </a:r>
+            <a:r>
+              <a:rPr/>
+              <a:t> </a:t>
+            </a:r>
+            <a:r>
+              <a:rPr/>
+              <a:t>Python</a:t>
+            </a:r>
+            <a:r>
+              <a:rPr/>
+              <a:t> </a:t>
+            </a:r>
+            <a:r>
+              <a:rPr/>
+              <a:t>code.</a:t>
+            </a:r>
+            <a:r>
+              <a:rPr/>
+              <a:t> </a:t>
+            </a:r>
+            <a:r>
+              <a:rPr/>
+              <a:t>Notice</a:t>
+            </a:r>
+            <a:r>
+              <a:rPr/>
+              <a:t> </a:t>
+            </a:r>
+            <a:r>
+              <a:rPr/>
+              <a:t>that</a:t>
+            </a:r>
+            <a:r>
+              <a:rPr/>
+              <a:t> </a:t>
+            </a:r>
+            <a:r>
+              <a:rPr/>
+              <a:t>the</a:t>
+            </a:r>
+            <a:r>
+              <a:rPr/>
+              <a:t> </a:t>
+            </a:r>
+            <a:r>
+              <a:rPr/>
+              <a:t>color</a:t>
+            </a:r>
+            <a:r>
+              <a:rPr/>
+              <a:t> </a:t>
+            </a:r>
+            <a:r>
+              <a:rPr/>
+              <a:t>and</a:t>
+            </a:r>
+            <a:r>
+              <a:rPr/>
+              <a:t> </a:t>
+            </a:r>
+            <a:r>
+              <a:rPr/>
+              <a:t>width</a:t>
+            </a:r>
+            <a:r>
+              <a:rPr/>
+              <a:t> </a:t>
+            </a:r>
+            <a:r>
+              <a:rPr/>
+              <a:t>are</a:t>
+            </a:r>
+            <a:r>
+              <a:rPr/>
+              <a:t> </a:t>
+            </a:r>
+            <a:r>
+              <a:rPr/>
+              <a:t>changed</a:t>
+            </a:r>
+            <a:r>
+              <a:rPr/>
+              <a:t> </a:t>
+            </a:r>
+            <a:r>
+              <a:rPr/>
+              <a:t>inside</a:t>
+            </a:r>
+            <a:r>
+              <a:rPr/>
+              <a:t> </a:t>
+            </a:r>
+            <a:r>
+              <a:rPr/>
+              <a:t>the</a:t>
+            </a:r>
+            <a:r>
+              <a:rPr/>
+              <a:t> </a:t>
+            </a:r>
+            <a:r>
+              <a:rPr/>
+              <a:t>mark_line</a:t>
+            </a:r>
+            <a:r>
+              <a:rPr/>
+              <a:t> </a:t>
+            </a:r>
+            <a:r>
+              <a:rPr/>
+              <a:t>function.</a:t>
+            </a:r>
+          </a:p>
+        </p:txBody>
+      </p:sp>
+      <p:sp>
+        <p:nvSpPr>
+          <p:cNvPr id="4" name="Slide Number Placeholder 3"/>
+          <p:cNvSpPr>
+            <a:spLocks noGrp="1"/>
+          </p:cNvSpPr>
+          <p:nvPr>
+            <p:ph type="sldNum" sz="quarter" idx="10"/>
+          </p:nvPr>
+        </p:nvSpPr>
+        <p:spPr/>
+        <p:txBody>
+          <a:bodyPr/>
+          <a:lstStyle/>
+          <a:p>
+            <a:fld id="{18BDFEC3-8487-43E8-A154-7C12CBC1FFF2}" type="slidenum">
+              <a:rPr lang="en-US"/>
+              <a:t>3</a:t>
+            </a:fld>
+            <a:endParaRPr lang="en-US"/>
+          </a:p>
+        </p:txBody>
+      </p:sp>
+    </p:spTree>
+  </p:cSld>
+</p:notes>
+</file>
+
+<file path=ppt/notesSlides/notesSlide3.xml><?xml version="1.0" encoding="utf-8"?>
+<p:notes xmlns:a="http://schemas.openxmlformats.org/drawingml/2006/main" xmlns:r="http://schemas.openxmlformats.org/officeDocument/2006/relationships" xmlns:p="http://schemas.openxmlformats.org/presentationml/2006/main">
+  <p:cSld>
+    <p:spTree>
+      <p:nvGrpSpPr>
+        <p:cNvPr id="1" name=""/>
+        <p:cNvGrpSpPr/>
+        <p:nvPr/>
+      </p:nvGrpSpPr>
+      <p:grpSpPr>
+        <a:xfrm>
+          <a:off x="0" y="0"/>
+          <a:ext cx="0" cy="0"/>
+          <a:chOff x="0" y="0"/>
+          <a:chExt cx="0" cy="0"/>
+        </a:xfrm>
+      </p:grpSpPr>
+      <p:sp>
+        <p:nvSpPr>
+          <p:cNvPr id="2" name="Slide Image Placeholder 1"/>
+          <p:cNvSpPr>
+            <a:spLocks noGrp="1" noRot="1" noChangeAspect="1"/>
+          </p:cNvSpPr>
+          <p:nvPr>
+            <p:ph type="sldImg"/>
+          </p:nvPr>
+        </p:nvSpPr>
+        <p:spPr/>
+      </p:sp>
+      <p:sp>
+        <p:nvSpPr>
+          <p:cNvPr id="3" name="Notes Placeholder 2"/>
+          <p:cNvSpPr>
+            <a:spLocks noGrp="1"/>
+          </p:cNvSpPr>
+          <p:nvPr>
+            <p:ph type="body" idx="1"/>
+          </p:nvPr>
+        </p:nvSpPr>
+        <p:spPr/>
+        <p:txBody>
+          <a:bodyPr/>
+          <a:lstStyle/>
+          <a:p>
+            <a:pPr lvl="0" marL="0" indent="0">
+              <a:buNone/>
+            </a:pPr>
+            <a:r>
+              <a:rPr/>
+              <a:t>Here</a:t>
+            </a:r>
+            <a:r>
+              <a:rPr/>
+              <a:t> </a:t>
+            </a:r>
+            <a:r>
+              <a:rPr/>
+              <a:t>is</a:t>
+            </a:r>
+            <a:r>
+              <a:rPr/>
+              <a:t> </a:t>
+            </a:r>
+            <a:r>
+              <a:rPr/>
+              <a:t>the</a:t>
+            </a:r>
+            <a:r>
+              <a:rPr/>
+              <a:t> </a:t>
+            </a:r>
+            <a:r>
+              <a:rPr/>
+              <a:t>R</a:t>
+            </a:r>
+            <a:r>
+              <a:rPr/>
+              <a:t> </a:t>
+            </a:r>
+            <a:r>
+              <a:rPr/>
+              <a:t>code.</a:t>
+            </a:r>
+            <a:r>
+              <a:rPr/>
+              <a:t> </a:t>
+            </a:r>
+            <a:r>
+              <a:rPr/>
+              <a:t>Notice</a:t>
+            </a:r>
+            <a:r>
+              <a:rPr/>
+              <a:t> </a:t>
+            </a:r>
+            <a:r>
+              <a:rPr/>
+              <a:t>that</a:t>
+            </a:r>
+            <a:r>
+              <a:rPr/>
+              <a:t> </a:t>
+            </a:r>
+            <a:r>
+              <a:rPr/>
+              <a:t>you</a:t>
+            </a:r>
+            <a:r>
+              <a:rPr/>
+              <a:t> </a:t>
+            </a:r>
+            <a:r>
+              <a:rPr/>
+              <a:t>change</a:t>
+            </a:r>
+            <a:r>
+              <a:rPr/>
+              <a:t> </a:t>
+            </a:r>
+            <a:r>
+              <a:rPr/>
+              <a:t>the</a:t>
+            </a:r>
+            <a:r>
+              <a:rPr/>
+              <a:t> </a:t>
+            </a:r>
+            <a:r>
+              <a:rPr/>
+              <a:t>size</a:t>
+            </a:r>
+            <a:r>
+              <a:rPr/>
+              <a:t> </a:t>
+            </a:r>
+            <a:r>
+              <a:rPr/>
+              <a:t>and</a:t>
+            </a:r>
+            <a:r>
+              <a:rPr/>
+              <a:t> </a:t>
+            </a:r>
+            <a:r>
+              <a:rPr/>
+              <a:t>color</a:t>
+            </a:r>
+            <a:r>
+              <a:rPr/>
+              <a:t> </a:t>
+            </a:r>
+            <a:r>
+              <a:rPr/>
+              <a:t>inside</a:t>
+            </a:r>
+            <a:r>
+              <a:rPr/>
+              <a:t> </a:t>
+            </a:r>
+            <a:r>
+              <a:rPr/>
+              <a:t>the</a:t>
+            </a:r>
+            <a:r>
+              <a:rPr/>
+              <a:t> </a:t>
+            </a:r>
+            <a:r>
+              <a:rPr/>
+              <a:t>geom_line</a:t>
+            </a:r>
+            <a:r>
+              <a:rPr/>
+              <a:t> </a:t>
+            </a:r>
+            <a:r>
+              <a:rPr/>
+              <a:t>function.</a:t>
+            </a:r>
+          </a:p>
+        </p:txBody>
+      </p:sp>
+      <p:sp>
+        <p:nvSpPr>
+          <p:cNvPr id="4" name="Slide Number Placeholder 3"/>
+          <p:cNvSpPr>
+            <a:spLocks noGrp="1"/>
+          </p:cNvSpPr>
+          <p:nvPr>
+            <p:ph type="sldNum" sz="quarter" idx="10"/>
+          </p:nvPr>
+        </p:nvSpPr>
+        <p:spPr/>
+        <p:txBody>
+          <a:bodyPr/>
+          <a:lstStyle/>
+          <a:p>
+            <a:fld id="{18BDFEC3-8487-43E8-A154-7C12CBC1FFF2}" type="slidenum">
+              <a:rPr lang="en-US"/>
+              <a:t>5</a:t>
+            </a:fld>
+            <a:endParaRPr lang="en-US"/>
+          </a:p>
+        </p:txBody>
+      </p:sp>
+    </p:spTree>
+  </p:cSld>
+</p:notes>
+</file>
+
+<file path=ppt/notesSlides/notesSlide4.xml><?xml version="1.0" encoding="utf-8"?>
+<p:notes xmlns:a="http://schemas.openxmlformats.org/drawingml/2006/main" xmlns:r="http://schemas.openxmlformats.org/officeDocument/2006/relationships" xmlns:p="http://schemas.openxmlformats.org/presentationml/2006/main">
+  <p:cSld>
+    <p:spTree>
+      <p:nvGrpSpPr>
+        <p:cNvPr id="1" name=""/>
+        <p:cNvGrpSpPr/>
+        <p:nvPr/>
+      </p:nvGrpSpPr>
+      <p:grpSpPr>
+        <a:xfrm>
+          <a:off x="0" y="0"/>
+          <a:ext cx="0" cy="0"/>
+          <a:chOff x="0" y="0"/>
+          <a:chExt cx="0" cy="0"/>
+        </a:xfrm>
+      </p:grpSpPr>
+      <p:sp>
+        <p:nvSpPr>
+          <p:cNvPr id="2" name="Slide Image Placeholder 1"/>
+          <p:cNvSpPr>
+            <a:spLocks noGrp="1" noRot="1" noChangeAspect="1"/>
+          </p:cNvSpPr>
+          <p:nvPr>
+            <p:ph type="sldImg"/>
+          </p:nvPr>
+        </p:nvSpPr>
+        <p:spPr/>
+      </p:sp>
+      <p:sp>
+        <p:nvSpPr>
+          <p:cNvPr id="3" name="Notes Placeholder 2"/>
+          <p:cNvSpPr>
+            <a:spLocks noGrp="1"/>
+          </p:cNvSpPr>
+          <p:nvPr>
+            <p:ph type="body" idx="1"/>
+          </p:nvPr>
+        </p:nvSpPr>
+        <p:spPr/>
+        <p:txBody>
+          <a:bodyPr/>
+          <a:lstStyle/>
+          <a:p>
+            <a:pPr lvl="0" marL="0" indent="0">
+              <a:buNone/>
+            </a:pPr>
+            <a:r>
+              <a:rPr/>
+              <a:t>Here</a:t>
+            </a:r>
+            <a:r>
+              <a:rPr/>
+              <a:t> </a:t>
+            </a:r>
+            <a:r>
+              <a:rPr/>
+              <a:t>is</a:t>
+            </a:r>
+            <a:r>
+              <a:rPr/>
+              <a:t> </a:t>
+            </a:r>
+            <a:r>
+              <a:rPr/>
+              <a:t>the</a:t>
+            </a:r>
+            <a:r>
+              <a:rPr/>
+              <a:t> </a:t>
+            </a:r>
+            <a:r>
+              <a:rPr/>
+              <a:t>R</a:t>
+            </a:r>
+            <a:r>
+              <a:rPr/>
+              <a:t> </a:t>
+            </a:r>
+            <a:r>
+              <a:rPr/>
+              <a:t>output.</a:t>
+            </a:r>
+          </a:p>
+        </p:txBody>
+      </p:sp>
+      <p:sp>
+        <p:nvSpPr>
+          <p:cNvPr id="4" name="Slide Number Placeholder 3"/>
+          <p:cNvSpPr>
+            <a:spLocks noGrp="1"/>
+          </p:cNvSpPr>
+          <p:nvPr>
+            <p:ph type="sldNum" sz="quarter" idx="10"/>
+          </p:nvPr>
+        </p:nvSpPr>
+        <p:spPr/>
+        <p:txBody>
+          <a:bodyPr/>
+          <a:lstStyle/>
+          <a:p>
+            <a:fld id="{18BDFEC3-8487-43E8-A154-7C12CBC1FFF2}" type="slidenum">
+              <a:rPr lang="en-US"/>
+              <a:t>6</a:t>
+            </a:fld>
+            <a:endParaRPr lang="en-US"/>
+          </a:p>
+        </p:txBody>
+      </p:sp>
+    </p:spTree>
+  </p:cSld>
+</p:notes>
+</file>
+
+<file path=ppt/notesSlides/notesSlide5.xml><?xml version="1.0" encoding="utf-8"?>
+<p:notes xmlns:a="http://schemas.openxmlformats.org/drawingml/2006/main" xmlns:r="http://schemas.openxmlformats.org/officeDocument/2006/relationships" xmlns:p="http://schemas.openxmlformats.org/presentationml/2006/main">
+  <p:cSld>
+    <p:spTree>
+      <p:nvGrpSpPr>
+        <p:cNvPr id="1" name=""/>
+        <p:cNvGrpSpPr/>
+        <p:nvPr/>
+      </p:nvGrpSpPr>
+      <p:grpSpPr>
+        <a:xfrm>
+          <a:off x="0" y="0"/>
+          <a:ext cx="0" cy="0"/>
+          <a:chOff x="0" y="0"/>
+          <a:chExt cx="0" cy="0"/>
+        </a:xfrm>
+      </p:grpSpPr>
+      <p:sp>
+        <p:nvSpPr>
+          <p:cNvPr id="2" name="Slide Image Placeholder 1"/>
+          <p:cNvSpPr>
+            <a:spLocks noGrp="1" noRot="1" noChangeAspect="1"/>
+          </p:cNvSpPr>
+          <p:nvPr>
+            <p:ph type="sldImg"/>
+          </p:nvPr>
+        </p:nvSpPr>
+        <p:spPr/>
+      </p:sp>
+      <p:sp>
+        <p:nvSpPr>
+          <p:cNvPr id="3" name="Notes Placeholder 2"/>
+          <p:cNvSpPr>
+            <a:spLocks noGrp="1"/>
+          </p:cNvSpPr>
+          <p:nvPr>
+            <p:ph type="body" idx="1"/>
+          </p:nvPr>
+        </p:nvSpPr>
+        <p:spPr/>
+        <p:txBody>
+          <a:bodyPr/>
+          <a:lstStyle/>
+          <a:p>
+            <a:pPr lvl="0" marL="0" indent="0">
+              <a:buNone/>
+            </a:pPr>
+            <a:r>
+              <a:rPr/>
+              <a:t>Here</a:t>
+            </a:r>
+            <a:r>
+              <a:rPr/>
+              <a:t> </a:t>
+            </a:r>
+            <a:r>
+              <a:rPr/>
+              <a:t>are</a:t>
+            </a:r>
+            <a:r>
+              <a:rPr/>
+              <a:t> </a:t>
+            </a:r>
+            <a:r>
+              <a:rPr/>
+              <a:t>the</a:t>
+            </a:r>
+            <a:r>
+              <a:rPr/>
+              <a:t> </a:t>
+            </a:r>
+            <a:r>
+              <a:rPr/>
+              <a:t>Tableau</a:t>
+            </a:r>
+            <a:r>
+              <a:rPr/>
+              <a:t> </a:t>
+            </a:r>
+            <a:r>
+              <a:rPr/>
+              <a:t>steps.</a:t>
+            </a:r>
+          </a:p>
+        </p:txBody>
+      </p:sp>
+      <p:sp>
+        <p:nvSpPr>
+          <p:cNvPr id="4" name="Slide Number Placeholder 3"/>
+          <p:cNvSpPr>
+            <a:spLocks noGrp="1"/>
+          </p:cNvSpPr>
+          <p:nvPr>
+            <p:ph type="sldNum" sz="quarter" idx="10"/>
+          </p:nvPr>
+        </p:nvSpPr>
+        <p:spPr/>
+        <p:txBody>
+          <a:bodyPr/>
+          <a:lstStyle/>
+          <a:p>
+            <a:fld id="{18BDFEC3-8487-43E8-A154-7C12CBC1FFF2}" type="slidenum">
+              <a:rPr lang="en-US"/>
+              <a:t>7</a:t>
+            </a:fld>
+            <a:endParaRPr lang="en-US"/>
+          </a:p>
+        </p:txBody>
+      </p:sp>
+    </p:spTree>
+  </p:cSld>
+</p:notes>
+</file>
+
+<file path=ppt/notesSlides/notesSlide6.xml><?xml version="1.0" encoding="utf-8"?>
+<p:notes xmlns:a="http://schemas.openxmlformats.org/drawingml/2006/main" xmlns:r="http://schemas.openxmlformats.org/officeDocument/2006/relationships" xmlns:p="http://schemas.openxmlformats.org/presentationml/2006/main">
+  <p:cSld>
+    <p:spTree>
+      <p:nvGrpSpPr>
+        <p:cNvPr id="1" name=""/>
+        <p:cNvGrpSpPr/>
+        <p:nvPr/>
+      </p:nvGrpSpPr>
+      <p:grpSpPr>
+        <a:xfrm>
+          <a:off x="0" y="0"/>
+          <a:ext cx="0" cy="0"/>
+          <a:chOff x="0" y="0"/>
+          <a:chExt cx="0" cy="0"/>
+        </a:xfrm>
+      </p:grpSpPr>
+      <p:sp>
+        <p:nvSpPr>
+          <p:cNvPr id="2" name="Slide Image Placeholder 1"/>
+          <p:cNvSpPr>
+            <a:spLocks noGrp="1" noRot="1" noChangeAspect="1"/>
+          </p:cNvSpPr>
+          <p:nvPr>
+            <p:ph type="sldImg"/>
+          </p:nvPr>
+        </p:nvSpPr>
+        <p:spPr/>
+      </p:sp>
+      <p:sp>
+        <p:nvSpPr>
+          <p:cNvPr id="3" name="Notes Placeholder 2"/>
+          <p:cNvSpPr>
+            <a:spLocks noGrp="1"/>
+          </p:cNvSpPr>
+          <p:nvPr>
+            <p:ph type="body" idx="1"/>
+          </p:nvPr>
+        </p:nvSpPr>
+        <p:spPr/>
+        <p:txBody>
+          <a:bodyPr/>
+          <a:lstStyle/>
+          <a:p>
+            <a:pPr lvl="0" marL="0" indent="0">
+              <a:buNone/>
+            </a:pPr>
+            <a:r>
+              <a:rPr/>
+              <a:t>Here</a:t>
+            </a:r>
+            <a:r>
+              <a:rPr/>
+              <a:t> </a:t>
+            </a:r>
+            <a:r>
+              <a:rPr/>
+              <a:t>is</a:t>
+            </a:r>
+            <a:r>
+              <a:rPr/>
+              <a:t> </a:t>
+            </a:r>
+            <a:r>
+              <a:rPr/>
+              <a:t>the</a:t>
+            </a:r>
+            <a:r>
+              <a:rPr/>
+              <a:t> </a:t>
+            </a:r>
+            <a:r>
+              <a:rPr/>
+              <a:t>Tableau</a:t>
+            </a:r>
+            <a:r>
+              <a:rPr/>
+              <a:t> </a:t>
+            </a:r>
+            <a:r>
+              <a:rPr/>
+              <a:t>output.</a:t>
+            </a:r>
+          </a:p>
+        </p:txBody>
+      </p:sp>
+      <p:sp>
+        <p:nvSpPr>
+          <p:cNvPr id="4" name="Slide Number Placeholder 3"/>
+          <p:cNvSpPr>
+            <a:spLocks noGrp="1"/>
+          </p:cNvSpPr>
+          <p:nvPr>
+            <p:ph type="sldNum" sz="quarter" idx="10"/>
+          </p:nvPr>
+        </p:nvSpPr>
+        <p:spPr/>
+        <p:txBody>
+          <a:bodyPr/>
+          <a:lstStyle/>
+          <a:p>
+            <a:fld id="{18BDFEC3-8487-43E8-A154-7C12CBC1FFF2}" type="slidenum">
+              <a:rPr lang="en-US"/>
+              <a:t>8</a:t>
             </a:fld>
             <a:endParaRPr lang="en-US"/>
           </a:p>
@@ -4037,21 +4799,21 @@
             <a:pPr lvl="2"/>
             <a:r>
               <a:rPr/>
-              <a:t>Use a dashed rather than a solid lineline to a dashed line.</a:t>
+              <a:t>Make the width equal to 3</a:t>
             </a:r>
           </a:p>
           <a:p>
             <a:pPr lvl="2"/>
             <a:r>
               <a:rPr/>
-              <a:t>Make the width equal to 3</a:t>
+              <a:t>Make the color green</a:t>
             </a:r>
           </a:p>
           <a:p>
             <a:pPr lvl="2"/>
             <a:r>
               <a:rPr/>
-              <a:t>Make the color green</a:t>
+              <a:t>Make the Y-axis start at 200 and end at 260</a:t>
             </a:r>
           </a:p>
         </p:txBody>
@@ -4170,7 +4932,7 @@
               <a:rPr sz="1800">
                 <a:latin typeface="Courier"/>
               </a:rPr>
-              <a:t>    strokeDash</a:t>
+              <a:t>    color</a:t>
             </a:r>
             <a:r>
               <a:rPr sz="1800">
@@ -4183,9 +4945,34 @@
             </a:r>
             <a:r>
               <a:rPr sz="1800">
+                <a:solidFill>
+                  <a:srgbClr val="4070A0"/>
+                </a:solidFill>
                 <a:latin typeface="Courier"/>
               </a:rPr>
-              <a:t>[</a:t>
+              <a:t>'green'</a:t>
+            </a:r>
+            <a:r>
+              <a:rPr sz="1800">
+                <a:latin typeface="Courier"/>
+              </a:rPr>
+              <a:t>,</a:t>
+            </a:r>
+            <a:br/>
+            <a:r>
+              <a:rPr sz="1800">
+                <a:latin typeface="Courier"/>
+              </a:rPr>
+              <a:t>    size</a:t>
+            </a:r>
+            <a:r>
+              <a:rPr sz="1800">
+                <a:solidFill>
+                  <a:srgbClr val="666666"/>
+                </a:solidFill>
+                <a:latin typeface="Courier"/>
+              </a:rPr>
+              <a:t>=</a:t>
             </a:r>
             <a:r>
               <a:rPr sz="1800">
@@ -4194,58 +4981,7 @@
                 </a:solidFill>
                 <a:latin typeface="Courier"/>
               </a:rPr>
-              <a:t>5</a:t>
-            </a:r>
-            <a:r>
-              <a:rPr sz="1800">
-                <a:latin typeface="Courier"/>
-              </a:rPr>
-              <a:t>, </a:t>
-            </a:r>
-            <a:r>
-              <a:rPr sz="1800">
-                <a:solidFill>
-                  <a:srgbClr val="40A070"/>
-                </a:solidFill>
-                <a:latin typeface="Courier"/>
-              </a:rPr>
-              <a:t>5</a:t>
-            </a:r>
-            <a:r>
-              <a:rPr sz="1800">
-                <a:latin typeface="Courier"/>
-              </a:rPr>
-              <a:t>, </a:t>
-            </a:r>
-            <a:r>
-              <a:rPr sz="1800">
-                <a:solidFill>
-                  <a:srgbClr val="40A070"/>
-                </a:solidFill>
-                <a:latin typeface="Courier"/>
-              </a:rPr>
-              <a:t>2</a:t>
-            </a:r>
-            <a:r>
-              <a:rPr sz="1800">
-                <a:latin typeface="Courier"/>
-              </a:rPr>
-              <a:t>, </a:t>
-            </a:r>
-            <a:r>
-              <a:rPr sz="1800">
-                <a:solidFill>
-                  <a:srgbClr val="40A070"/>
-                </a:solidFill>
-                <a:latin typeface="Courier"/>
-              </a:rPr>
-              <a:t>5</a:t>
-            </a:r>
-            <a:r>
-              <a:rPr sz="1800">
-                <a:latin typeface="Courier"/>
-              </a:rPr>
-              <a:t>]</a:t>
+              <a:t>3</a:t>
             </a:r>
             <a:br/>
             <a:r>
@@ -4296,7 +5032,14 @@
               <a:rPr sz="1800">
                 <a:latin typeface="Courier"/>
               </a:rPr>
-              <a:t>, scale</a:t>
+              <a:t>, </a:t>
+            </a:r>
+            <a:br/>
+            <a:r>
+              <a:rPr sz="1800">
+                <a:latin typeface="Courier"/>
+              </a:rPr>
+              <a:t>        scale</a:t>
             </a:r>
             <a:r>
               <a:rPr sz="1800">
@@ -4350,7 +5093,7 @@
                 </a:solidFill>
                 <a:latin typeface="Courier"/>
               </a:rPr>
-              <a:t>400</a:t>
+              <a:t>260</a:t>
             </a:r>
             <a:r>
               <a:rPr sz="1800">
@@ -4431,6 +5174,106 @@
           </a:p>
         </p:txBody>
       </p:sp>
+      <p:pic>
+        <p:nvPicPr>
+          <p:cNvPr descr="../images/python/green-line.png" id="0" name="Picture 1"/>
+          <p:cNvPicPr>
+            <a:picLocks noGrp="1" noChangeAspect="1"/>
+          </p:cNvPicPr>
+          <p:nvPr/>
+        </p:nvPicPr>
+        <p:blipFill>
+          <a:blip r:embed="rId2"/>
+          <a:stretch>
+            <a:fillRect/>
+          </a:stretch>
+        </p:blipFill>
+        <p:spPr bwMode="auto">
+          <a:xfrm>
+            <a:off x="1968500" y="1600200"/>
+            <a:ext cx="5194300" cy="4013200"/>
+          </a:xfrm>
+          <a:prstGeom prst="rect">
+            <a:avLst/>
+          </a:prstGeom>
+          <a:noFill/>
+          <a:ln w="9525">
+            <a:noFill/>
+            <a:headEnd/>
+            <a:tailEnd/>
+          </a:ln>
+        </p:spPr>
+      </p:pic>
+      <p:sp>
+        <p:nvSpPr>
+          <p:cNvPr id="1" name="TextBox 3"/>
+          <p:cNvSpPr txBox="1"/>
+          <p:nvPr/>
+        </p:nvSpPr>
+        <p:spPr>
+          <a:xfrm>
+            <a:off x="457200" y="5613400"/>
+            <a:ext cx="8229600" cy="508000"/>
+          </a:xfrm>
+          <a:prstGeom prst="rect">
+            <a:avLst/>
+          </a:prstGeom>
+          <a:noFill/>
+        </p:spPr>
+        <p:txBody>
+          <a:bodyPr/>
+          <a:lstStyle/>
+          <a:p>
+            <a:pPr lvl="0" marL="0" indent="0" algn="ctr">
+              <a:buNone/>
+            </a:pPr>
+            <a:r>
+              <a:rPr/>
+              <a:t>Line</a:t>
+            </a:r>
+            <a:r>
+              <a:rPr/>
+              <a:t> </a:t>
+            </a:r>
+            <a:r>
+              <a:rPr/>
+              <a:t>graph</a:t>
+            </a:r>
+            <a:r>
+              <a:rPr/>
+              <a:t> </a:t>
+            </a:r>
+            <a:r>
+              <a:rPr/>
+              <a:t>with</a:t>
+            </a:r>
+            <a:r>
+              <a:rPr/>
+              <a:t> </a:t>
+            </a:r>
+            <a:r>
+              <a:rPr/>
+              <a:t>green</a:t>
+            </a:r>
+            <a:r>
+              <a:rPr/>
+              <a:t> </a:t>
+            </a:r>
+            <a:r>
+              <a:rPr/>
+              <a:t>dashed</a:t>
+            </a:r>
+            <a:r>
+              <a:rPr/>
+              <a:t> </a:t>
+            </a:r>
+            <a:r>
+              <a:rPr/>
+              <a:t>line</a:t>
+            </a:r>
+          </a:p>
+        </p:txBody>
+      </p:sp>
     </p:spTree>
   </p:cSld>
 </p:sld>
@@ -4524,7 +5367,7 @@
                 <a:latin typeface="Courier"/>
               </a:rPr>
               <a:t>ggplot(cpi, aes(x=t, y=CPI)) +
-  geom_line(size=3, linetype="dashed", color="green")</a:t>
+  geom_line(size=3, color="green")</a:t>
             </a:r>
           </a:p>
         </p:txBody>
@@ -4601,7 +5444,7 @@
           <p:nvPr/>
         </p:nvPicPr>
         <p:blipFill>
-          <a:blip r:embed="rId2"/>
+          <a:blip r:embed="rId3"/>
           <a:stretch>
             <a:fillRect/>
           </a:stretch>
@@ -4685,6 +5528,78 @@
           </a:p>
         </p:txBody>
       </p:sp>
+      <p:sp>
+        <p:nvSpPr>
+          <p:cNvPr id="3" name="Content Placeholder 2"/>
+          <p:cNvSpPr>
+            <a:spLocks noGrp="1"/>
+          </p:cNvSpPr>
+          <p:nvPr>
+            <p:ph idx="1"/>
+          </p:nvPr>
+        </p:nvSpPr>
+        <p:spPr/>
+        <p:txBody>
+          <a:bodyPr/>
+          <a:lstStyle/>
+          <a:p>
+            <a:pPr lvl="1"/>
+            <a:r>
+              <a:rPr/>
+              <a:t>Drag T to coumns, CPI to rows</a:t>
+            </a:r>
+          </a:p>
+          <a:p>
+            <a:pPr lvl="2"/>
+            <a:r>
+              <a:rPr/>
+              <a:t>Set both as Dimension, Continuous (Green pill)</a:t>
+            </a:r>
+          </a:p>
+          <a:p>
+            <a:pPr lvl="1"/>
+            <a:r>
+              <a:rPr/>
+              <a:t>Change Marks pull-down to Line</a:t>
+            </a:r>
+          </a:p>
+          <a:p>
+            <a:pPr lvl="1"/>
+            <a:r>
+              <a:rPr/>
+              <a:t>Click on the color button, select green</a:t>
+            </a:r>
+          </a:p>
+          <a:p>
+            <a:pPr lvl="1"/>
+            <a:r>
+              <a:rPr/>
+              <a:t>Click on size button, move slider to the right</a:t>
+            </a:r>
+          </a:p>
+          <a:p>
+            <a:pPr lvl="1"/>
+            <a:r>
+              <a:rPr/>
+              <a:t>Double click on Y axis</a:t>
+            </a:r>
+          </a:p>
+          <a:p>
+            <a:pPr lvl="2"/>
+            <a:r>
+              <a:rPr/>
+              <a:t>Select Range, Fixed</a:t>
+            </a:r>
+          </a:p>
+          <a:p>
+            <a:pPr lvl="2"/>
+            <a:r>
+              <a:rPr/>
+              <a:t>Enter 200, 260 as fixed start, fixed end</a:t>
+            </a:r>
+          </a:p>
+        </p:txBody>
+      </p:sp>
     </p:spTree>
   </p:cSld>
 </p:sld>
@@ -4744,6 +5659,106 @@
             <a:r>
               <a:rPr/>
               <a:t>output</a:t>
+            </a:r>
+          </a:p>
+        </p:txBody>
+      </p:sp>
+      <p:pic>
+        <p:nvPicPr>
+          <p:cNvPr descr="../images/tableau/green-line.png" id="0" name="Picture 1"/>
+          <p:cNvPicPr>
+            <a:picLocks noGrp="1" noChangeAspect="1"/>
+          </p:cNvPicPr>
+          <p:nvPr/>
+        </p:nvPicPr>
+        <p:blipFill>
+          <a:blip r:embed="rId3"/>
+          <a:stretch>
+            <a:fillRect/>
+          </a:stretch>
+        </p:blipFill>
+        <p:spPr bwMode="auto">
+          <a:xfrm>
+            <a:off x="558800" y="1600200"/>
+            <a:ext cx="8026400" cy="4013200"/>
+          </a:xfrm>
+          <a:prstGeom prst="rect">
+            <a:avLst/>
+          </a:prstGeom>
+          <a:noFill/>
+          <a:ln w="9525">
+            <a:noFill/>
+            <a:headEnd/>
+            <a:tailEnd/>
+          </a:ln>
+        </p:spPr>
+      </p:pic>
+      <p:sp>
+        <p:nvSpPr>
+          <p:cNvPr id="1" name="TextBox 3"/>
+          <p:cNvSpPr txBox="1"/>
+          <p:nvPr/>
+        </p:nvSpPr>
+        <p:spPr>
+          <a:xfrm>
+            <a:off x="457200" y="5613400"/>
+            <a:ext cx="8229600" cy="508000"/>
+          </a:xfrm>
+          <a:prstGeom prst="rect">
+            <a:avLst/>
+          </a:prstGeom>
+          <a:noFill/>
+        </p:spPr>
+        <p:txBody>
+          <a:bodyPr/>
+          <a:lstStyle/>
+          <a:p>
+            <a:pPr lvl="0" marL="0" indent="0" algn="ctr">
+              <a:buNone/>
+            </a:pPr>
+            <a:r>
+              <a:rPr/>
+              <a:t>Line</a:t>
+            </a:r>
+            <a:r>
+              <a:rPr/>
+              <a:t> </a:t>
+            </a:r>
+            <a:r>
+              <a:rPr/>
+              <a:t>graph</a:t>
+            </a:r>
+            <a:r>
+              <a:rPr/>
+              <a:t> </a:t>
+            </a:r>
+            <a:r>
+              <a:rPr/>
+              <a:t>with</a:t>
+            </a:r>
+            <a:r>
+              <a:rPr/>
+              <a:t> </a:t>
+            </a:r>
+            <a:r>
+              <a:rPr/>
+              <a:t>thick</a:t>
+            </a:r>
+            <a:r>
+              <a:rPr/>
+              <a:t> </a:t>
+            </a:r>
+            <a:r>
+              <a:rPr/>
+              <a:t>green</a:t>
+            </a:r>
+            <a:r>
+              <a:rPr/>
+              <a:t> </a:t>
+            </a:r>
+            <a:r>
+              <a:rPr/>
+              <a:t>line</a:t>
             </a:r>
           </a:p>
         </p:txBody>

</xml_diff>